<commit_message>
new images for live playground
</commit_message>
<xml_diff>
--- a/images/Pictures.pptx
+++ b/images/Pictures.pptx
@@ -6,7 +6,7 @@
     <p:sldMasterId id="2147483672" r:id="rId2"/>
   </p:sldMasterIdLst>
   <p:notesMasterIdLst>
-    <p:notesMasterId r:id="rId16"/>
+    <p:notesMasterId r:id="rId17"/>
   </p:notesMasterIdLst>
   <p:sldIdLst>
     <p:sldId id="303" r:id="rId3"/>
@@ -22,6 +22,7 @@
     <p:sldId id="313" r:id="rId13"/>
     <p:sldId id="314" r:id="rId14"/>
     <p:sldId id="315" r:id="rId15"/>
+    <p:sldId id="316" r:id="rId16"/>
   </p:sldIdLst>
   <p:sldSz cx="9144000" cy="6858000" type="screen4x3"/>
   <p:notesSz cx="6858000" cy="9144000"/>
@@ -188,7 +189,7 @@
             </a:lvl1pPr>
           </a:lstStyle>
           <a:p>
-            <a:endParaRPr lang="en-US"/>
+            <a:endParaRPr lang="en-US" dirty="0"/>
           </a:p>
         </p:txBody>
       </p:sp>
@@ -222,9 +223,9 @@
             <a:fld id="{581B34DE-D9D5-401C-8A45-6D5600A3470E}" type="datetimeFigureOut">
               <a:rPr lang="en-US" smtClean="0"/>
               <a:pPr/>
-              <a:t>10/24/2016</a:t>
+              <a:t>10/27/2016</a:t>
             </a:fld>
-            <a:endParaRPr lang="en-US"/>
+            <a:endParaRPr lang="en-US" dirty="0"/>
           </a:p>
         </p:txBody>
       </p:sp>
@@ -257,7 +258,7 @@
           <a:bodyPr vert="horz" lIns="91440" tIns="45720" rIns="91440" bIns="45720" rtlCol="0" anchor="ctr"/>
           <a:lstStyle/>
           <a:p>
-            <a:endParaRPr lang="en-US"/>
+            <a:endParaRPr lang="en-US" dirty="0"/>
           </a:p>
         </p:txBody>
       </p:sp>
@@ -347,7 +348,7 @@
             </a:lvl1pPr>
           </a:lstStyle>
           <a:p>
-            <a:endParaRPr lang="en-US"/>
+            <a:endParaRPr lang="en-US" dirty="0"/>
           </a:p>
         </p:txBody>
       </p:sp>
@@ -383,7 +384,7 @@
               <a:pPr/>
               <a:t>‹N›</a:t>
             </a:fld>
-            <a:endParaRPr lang="en-US"/>
+            <a:endParaRPr lang="en-US" dirty="0"/>
           </a:p>
         </p:txBody>
       </p:sp>
@@ -1242,9 +1243,9 @@
             <a:fld id="{3D599013-5C43-42B3-986A-3CF64AAE02B4}" type="datetimeFigureOut">
               <a:rPr lang="en-US" smtClean="0"/>
               <a:pPr/>
-              <a:t>10/24/2016</a:t>
+              <a:t>10/27/2016</a:t>
             </a:fld>
-            <a:endParaRPr lang="en-US"/>
+            <a:endParaRPr lang="en-US" dirty="0"/>
           </a:p>
         </p:txBody>
       </p:sp>
@@ -1263,7 +1264,7 @@
           <a:bodyPr/>
           <a:lstStyle/>
           <a:p>
-            <a:endParaRPr lang="en-US"/>
+            <a:endParaRPr lang="en-US" dirty="0"/>
           </a:p>
         </p:txBody>
       </p:sp>
@@ -1287,7 +1288,7 @@
               <a:pPr/>
               <a:t>‹N›</a:t>
             </a:fld>
-            <a:endParaRPr lang="en-US"/>
+            <a:endParaRPr lang="en-US" dirty="0"/>
           </a:p>
         </p:txBody>
       </p:sp>
@@ -1414,9 +1415,9 @@
             <a:fld id="{3D599013-5C43-42B3-986A-3CF64AAE02B4}" type="datetimeFigureOut">
               <a:rPr lang="en-US" smtClean="0"/>
               <a:pPr/>
-              <a:t>10/24/2016</a:t>
+              <a:t>10/27/2016</a:t>
             </a:fld>
-            <a:endParaRPr lang="en-US"/>
+            <a:endParaRPr lang="en-US" dirty="0"/>
           </a:p>
         </p:txBody>
       </p:sp>
@@ -1435,7 +1436,7 @@
           <a:bodyPr/>
           <a:lstStyle/>
           <a:p>
-            <a:endParaRPr lang="en-US"/>
+            <a:endParaRPr lang="en-US" dirty="0"/>
           </a:p>
         </p:txBody>
       </p:sp>
@@ -1459,7 +1460,7 @@
               <a:pPr/>
               <a:t>‹N›</a:t>
             </a:fld>
-            <a:endParaRPr lang="en-US"/>
+            <a:endParaRPr lang="en-US" dirty="0"/>
           </a:p>
         </p:txBody>
       </p:sp>
@@ -1596,9 +1597,9 @@
             <a:fld id="{3D599013-5C43-42B3-986A-3CF64AAE02B4}" type="datetimeFigureOut">
               <a:rPr lang="en-US" smtClean="0"/>
               <a:pPr/>
-              <a:t>10/24/2016</a:t>
+              <a:t>10/27/2016</a:t>
             </a:fld>
-            <a:endParaRPr lang="en-US"/>
+            <a:endParaRPr lang="en-US" dirty="0"/>
           </a:p>
         </p:txBody>
       </p:sp>
@@ -1617,7 +1618,7 @@
           <a:bodyPr/>
           <a:lstStyle/>
           <a:p>
-            <a:endParaRPr lang="en-US"/>
+            <a:endParaRPr lang="en-US" dirty="0"/>
           </a:p>
         </p:txBody>
       </p:sp>
@@ -1641,7 +1642,7 @@
               <a:pPr/>
               <a:t>‹N›</a:t>
             </a:fld>
-            <a:endParaRPr lang="en-US"/>
+            <a:endParaRPr lang="en-US" dirty="0"/>
           </a:p>
         </p:txBody>
       </p:sp>
@@ -1787,9 +1788,9 @@
           <a:p>
             <a:fld id="{3F96F2D7-2467-4E8E-B24B-63336E0458CC}" type="datetimeFigureOut">
               <a:rPr lang="it-IT" smtClean="0"/>
-              <a:t>24/10/2016</a:t>
+              <a:t>27/10/2016</a:t>
             </a:fld>
-            <a:endParaRPr lang="it-IT"/>
+            <a:endParaRPr lang="it-IT" dirty="0"/>
           </a:p>
         </p:txBody>
       </p:sp>
@@ -1812,7 +1813,7 @@
               <a:defRPr/>
             </a:pPr>
             <a:r>
-              <a:rPr lang="en-US"/>
+              <a:rPr lang="en-US" dirty="0"/>
               <a:t>© ETSI 2015. All rights reserved</a:t>
             </a:r>
           </a:p>
@@ -1838,7 +1839,7 @@
               <a:pPr/>
               <a:t>‹N›</a:t>
             </a:fld>
-            <a:endParaRPr lang="en-US"/>
+            <a:endParaRPr lang="en-US" dirty="0"/>
           </a:p>
         </p:txBody>
       </p:sp>
@@ -1963,9 +1964,9 @@
           <a:p>
             <a:fld id="{3F96F2D7-2467-4E8E-B24B-63336E0458CC}" type="datetimeFigureOut">
               <a:rPr lang="it-IT" smtClean="0"/>
-              <a:t>24/10/2016</a:t>
+              <a:t>27/10/2016</a:t>
             </a:fld>
-            <a:endParaRPr lang="it-IT"/>
+            <a:endParaRPr lang="it-IT" dirty="0"/>
           </a:p>
         </p:txBody>
       </p:sp>
@@ -1988,7 +1989,7 @@
               <a:defRPr/>
             </a:pPr>
             <a:r>
-              <a:rPr lang="en-US"/>
+              <a:rPr lang="en-US" dirty="0"/>
               <a:t>© ETSI 2015. All rights reserved</a:t>
             </a:r>
           </a:p>
@@ -2014,7 +2015,7 @@
               <a:pPr/>
               <a:t>‹N›</a:t>
             </a:fld>
-            <a:endParaRPr lang="en-US"/>
+            <a:endParaRPr lang="en-US" dirty="0"/>
           </a:p>
         </p:txBody>
       </p:sp>
@@ -2216,9 +2217,9 @@
           <a:p>
             <a:fld id="{3F96F2D7-2467-4E8E-B24B-63336E0458CC}" type="datetimeFigureOut">
               <a:rPr lang="it-IT" smtClean="0"/>
-              <a:t>24/10/2016</a:t>
+              <a:t>27/10/2016</a:t>
             </a:fld>
-            <a:endParaRPr lang="it-IT"/>
+            <a:endParaRPr lang="it-IT" dirty="0"/>
           </a:p>
         </p:txBody>
       </p:sp>
@@ -2241,7 +2242,7 @@
               <a:defRPr/>
             </a:pPr>
             <a:r>
-              <a:rPr lang="en-US"/>
+              <a:rPr lang="en-US" dirty="0"/>
               <a:t>© ETSI 2015. All rights reserved</a:t>
             </a:r>
           </a:p>
@@ -2267,7 +2268,7 @@
               <a:pPr/>
               <a:t>‹N›</a:t>
             </a:fld>
-            <a:endParaRPr lang="en-US"/>
+            <a:endParaRPr lang="en-US" dirty="0"/>
           </a:p>
         </p:txBody>
       </p:sp>
@@ -2453,9 +2454,9 @@
           <a:p>
             <a:fld id="{3F96F2D7-2467-4E8E-B24B-63336E0458CC}" type="datetimeFigureOut">
               <a:rPr lang="it-IT" smtClean="0"/>
-              <a:t>24/10/2016</a:t>
+              <a:t>27/10/2016</a:t>
             </a:fld>
-            <a:endParaRPr lang="it-IT"/>
+            <a:endParaRPr lang="it-IT" dirty="0"/>
           </a:p>
         </p:txBody>
       </p:sp>
@@ -2478,7 +2479,7 @@
               <a:defRPr/>
             </a:pPr>
             <a:r>
-              <a:rPr lang="en-US"/>
+              <a:rPr lang="en-US" dirty="0"/>
               <a:t>© ETSI 2015. All rights reserved</a:t>
             </a:r>
           </a:p>
@@ -2504,7 +2505,7 @@
               <a:pPr/>
               <a:t>‹N›</a:t>
             </a:fld>
-            <a:endParaRPr lang="en-US"/>
+            <a:endParaRPr lang="en-US" dirty="0"/>
           </a:p>
         </p:txBody>
       </p:sp>
@@ -2825,9 +2826,9 @@
           <a:p>
             <a:fld id="{3F96F2D7-2467-4E8E-B24B-63336E0458CC}" type="datetimeFigureOut">
               <a:rPr lang="it-IT" smtClean="0"/>
-              <a:t>24/10/2016</a:t>
+              <a:t>27/10/2016</a:t>
             </a:fld>
-            <a:endParaRPr lang="it-IT"/>
+            <a:endParaRPr lang="it-IT" dirty="0"/>
           </a:p>
         </p:txBody>
       </p:sp>
@@ -2850,7 +2851,7 @@
               <a:defRPr/>
             </a:pPr>
             <a:r>
-              <a:rPr lang="en-US"/>
+              <a:rPr lang="en-US" dirty="0"/>
               <a:t>© ETSI 2015. All rights reserved</a:t>
             </a:r>
           </a:p>
@@ -2876,7 +2877,7 @@
               <a:pPr/>
               <a:t>‹N›</a:t>
             </a:fld>
-            <a:endParaRPr lang="en-US"/>
+            <a:endParaRPr lang="en-US" dirty="0"/>
           </a:p>
         </p:txBody>
       </p:sp>
@@ -2950,9 +2951,9 @@
           <a:p>
             <a:fld id="{3F96F2D7-2467-4E8E-B24B-63336E0458CC}" type="datetimeFigureOut">
               <a:rPr lang="it-IT" smtClean="0"/>
-              <a:t>24/10/2016</a:t>
+              <a:t>27/10/2016</a:t>
             </a:fld>
-            <a:endParaRPr lang="it-IT"/>
+            <a:endParaRPr lang="it-IT" dirty="0"/>
           </a:p>
         </p:txBody>
       </p:sp>
@@ -2975,7 +2976,7 @@
               <a:defRPr/>
             </a:pPr>
             <a:r>
-              <a:rPr lang="en-US"/>
+              <a:rPr lang="en-US" dirty="0"/>
               <a:t>© ETSI 2015. All rights reserved</a:t>
             </a:r>
           </a:p>
@@ -3001,7 +3002,7 @@
               <a:pPr/>
               <a:t>‹N›</a:t>
             </a:fld>
-            <a:endParaRPr lang="en-US"/>
+            <a:endParaRPr lang="en-US" dirty="0"/>
           </a:p>
         </p:txBody>
       </p:sp>
@@ -3053,9 +3054,9 @@
           <a:p>
             <a:fld id="{3F96F2D7-2467-4E8E-B24B-63336E0458CC}" type="datetimeFigureOut">
               <a:rPr lang="it-IT" smtClean="0"/>
-              <a:t>24/10/2016</a:t>
+              <a:t>27/10/2016</a:t>
             </a:fld>
-            <a:endParaRPr lang="it-IT"/>
+            <a:endParaRPr lang="it-IT" dirty="0"/>
           </a:p>
         </p:txBody>
       </p:sp>
@@ -3078,7 +3079,7 @@
               <a:defRPr/>
             </a:pPr>
             <a:r>
-              <a:rPr lang="en-US"/>
+              <a:rPr lang="en-US" dirty="0"/>
               <a:t>© ETSI 2015. All rights reserved</a:t>
             </a:r>
           </a:p>
@@ -3104,7 +3105,7 @@
               <a:pPr/>
               <a:t>‹N›</a:t>
             </a:fld>
-            <a:endParaRPr lang="en-US"/>
+            <a:endParaRPr lang="en-US" dirty="0"/>
           </a:p>
         </p:txBody>
       </p:sp>
@@ -3336,9 +3337,9 @@
           <a:p>
             <a:fld id="{3F96F2D7-2467-4E8E-B24B-63336E0458CC}" type="datetimeFigureOut">
               <a:rPr lang="it-IT" smtClean="0"/>
-              <a:t>24/10/2016</a:t>
+              <a:t>27/10/2016</a:t>
             </a:fld>
-            <a:endParaRPr lang="it-IT"/>
+            <a:endParaRPr lang="it-IT" dirty="0"/>
           </a:p>
         </p:txBody>
       </p:sp>
@@ -3361,7 +3362,7 @@
               <a:defRPr/>
             </a:pPr>
             <a:r>
-              <a:rPr lang="en-US"/>
+              <a:rPr lang="en-US" dirty="0"/>
               <a:t>© ETSI 2015. All rights reserved</a:t>
             </a:r>
           </a:p>
@@ -3387,7 +3388,7 @@
               <a:pPr/>
               <a:t>‹N›</a:t>
             </a:fld>
-            <a:endParaRPr lang="en-US"/>
+            <a:endParaRPr lang="en-US" dirty="0"/>
           </a:p>
         </p:txBody>
       </p:sp>
@@ -3515,9 +3516,9 @@
             <a:fld id="{3D599013-5C43-42B3-986A-3CF64AAE02B4}" type="datetimeFigureOut">
               <a:rPr lang="en-US" smtClean="0"/>
               <a:pPr/>
-              <a:t>10/24/2016</a:t>
+              <a:t>10/27/2016</a:t>
             </a:fld>
-            <a:endParaRPr lang="en-US"/>
+            <a:endParaRPr lang="en-US" dirty="0"/>
           </a:p>
         </p:txBody>
       </p:sp>
@@ -3536,7 +3537,7 @@
           <a:bodyPr/>
           <a:lstStyle/>
           <a:p>
-            <a:endParaRPr lang="en-US"/>
+            <a:endParaRPr lang="en-US" dirty="0"/>
           </a:p>
         </p:txBody>
       </p:sp>
@@ -3560,7 +3561,7 @@
               <a:pPr/>
               <a:t>‹N›</a:t>
             </a:fld>
-            <a:endParaRPr lang="en-US"/>
+            <a:endParaRPr lang="en-US" dirty="0"/>
           </a:p>
         </p:txBody>
       </p:sp>
@@ -3682,7 +3683,7 @@
             </a:lvl9pPr>
           </a:lstStyle>
           <a:p>
-            <a:endParaRPr lang="it-IT"/>
+            <a:endParaRPr lang="it-IT" dirty="0"/>
           </a:p>
         </p:txBody>
       </p:sp>
@@ -3768,9 +3769,9 @@
           <a:p>
             <a:fld id="{3F96F2D7-2467-4E8E-B24B-63336E0458CC}" type="datetimeFigureOut">
               <a:rPr lang="it-IT" smtClean="0"/>
-              <a:t>24/10/2016</a:t>
+              <a:t>27/10/2016</a:t>
             </a:fld>
-            <a:endParaRPr lang="it-IT"/>
+            <a:endParaRPr lang="it-IT" dirty="0"/>
           </a:p>
         </p:txBody>
       </p:sp>
@@ -3793,7 +3794,7 @@
               <a:defRPr/>
             </a:pPr>
             <a:r>
-              <a:rPr lang="en-US"/>
+              <a:rPr lang="en-US" dirty="0"/>
               <a:t>© ETSI 2015. All rights reserved</a:t>
             </a:r>
           </a:p>
@@ -3819,7 +3820,7 @@
               <a:pPr/>
               <a:t>‹N›</a:t>
             </a:fld>
-            <a:endParaRPr lang="en-US"/>
+            <a:endParaRPr lang="en-US" dirty="0"/>
           </a:p>
         </p:txBody>
       </p:sp>
@@ -3944,9 +3945,9 @@
           <a:p>
             <a:fld id="{3F96F2D7-2467-4E8E-B24B-63336E0458CC}" type="datetimeFigureOut">
               <a:rPr lang="it-IT" smtClean="0"/>
-              <a:t>24/10/2016</a:t>
+              <a:t>27/10/2016</a:t>
             </a:fld>
-            <a:endParaRPr lang="it-IT"/>
+            <a:endParaRPr lang="it-IT" dirty="0"/>
           </a:p>
         </p:txBody>
       </p:sp>
@@ -3969,7 +3970,7 @@
               <a:defRPr/>
             </a:pPr>
             <a:r>
-              <a:rPr lang="en-US"/>
+              <a:rPr lang="en-US" dirty="0"/>
               <a:t>© ETSI 2015. All rights reserved</a:t>
             </a:r>
           </a:p>
@@ -3995,7 +3996,7 @@
               <a:pPr/>
               <a:t>‹N›</a:t>
             </a:fld>
-            <a:endParaRPr lang="en-US"/>
+            <a:endParaRPr lang="en-US" dirty="0"/>
           </a:p>
         </p:txBody>
       </p:sp>
@@ -4130,9 +4131,9 @@
           <a:p>
             <a:fld id="{3F96F2D7-2467-4E8E-B24B-63336E0458CC}" type="datetimeFigureOut">
               <a:rPr lang="it-IT" smtClean="0"/>
-              <a:t>24/10/2016</a:t>
+              <a:t>27/10/2016</a:t>
             </a:fld>
-            <a:endParaRPr lang="it-IT"/>
+            <a:endParaRPr lang="it-IT" dirty="0"/>
           </a:p>
         </p:txBody>
       </p:sp>
@@ -4155,7 +4156,7 @@
               <a:defRPr/>
             </a:pPr>
             <a:r>
-              <a:rPr lang="en-US"/>
+              <a:rPr lang="en-US" dirty="0"/>
               <a:t>© ETSI 2015. All rights reserved</a:t>
             </a:r>
           </a:p>
@@ -4181,7 +4182,7 @@
               <a:pPr/>
               <a:t>‹N›</a:t>
             </a:fld>
-            <a:endParaRPr lang="en-US"/>
+            <a:endParaRPr lang="en-US" dirty="0"/>
           </a:p>
         </p:txBody>
       </p:sp>
@@ -4264,7 +4265,7 @@
               <a:defRPr/>
             </a:pPr>
             <a:r>
-              <a:rPr lang="en-US"/>
+              <a:rPr lang="en-US" dirty="0"/>
               <a:t>© ETSI 2015. All rights reserved</a:t>
             </a:r>
           </a:p>
@@ -4294,7 +4295,7 @@
               <a:pPr/>
               <a:t>‹N›</a:t>
             </a:fld>
-            <a:endParaRPr lang="en-US"/>
+            <a:endParaRPr lang="en-US" dirty="0"/>
           </a:p>
         </p:txBody>
       </p:sp>
@@ -4664,10 +4665,9 @@
               <a:defRPr/>
             </a:pPr>
             <a:r>
-              <a:rPr lang="en-US"/>
+              <a:rPr lang="en-US" dirty="0"/>
               <a:t>© ETSI 2015. All rights reserved</a:t>
             </a:r>
-            <a:endParaRPr lang="en-US" dirty="0"/>
           </a:p>
         </p:txBody>
       </p:sp>
@@ -4912,7 +4912,7 @@
               <a:pPr/>
               <a:t>‹N›</a:t>
             </a:fld>
-            <a:endParaRPr lang="en-US"/>
+            <a:endParaRPr lang="en-US" dirty="0"/>
           </a:p>
         </p:txBody>
       </p:sp>
@@ -4945,7 +4945,7 @@
               <a:defRPr/>
             </a:pPr>
             <a:r>
-              <a:rPr lang="en-US"/>
+              <a:rPr lang="en-US" dirty="0"/>
               <a:t>© ETSI 2015. All rights reserved</a:t>
             </a:r>
           </a:p>
@@ -5192,7 +5192,7 @@
               <a:pPr/>
               <a:t>‹N›</a:t>
             </a:fld>
-            <a:endParaRPr lang="en-US"/>
+            <a:endParaRPr lang="en-US" dirty="0"/>
           </a:p>
         </p:txBody>
       </p:sp>
@@ -5225,7 +5225,7 @@
               <a:defRPr/>
             </a:pPr>
             <a:r>
-              <a:rPr lang="en-US"/>
+              <a:rPr lang="en-US" dirty="0"/>
               <a:t>© ETSI 2015. All rights reserved</a:t>
             </a:r>
           </a:p>
@@ -5472,7 +5472,7 @@
               <a:pPr/>
               <a:t>‹N›</a:t>
             </a:fld>
-            <a:endParaRPr lang="en-US"/>
+            <a:endParaRPr lang="en-US" dirty="0"/>
           </a:p>
         </p:txBody>
       </p:sp>
@@ -5505,7 +5505,7 @@
               <a:defRPr/>
             </a:pPr>
             <a:r>
-              <a:rPr lang="en-US"/>
+              <a:rPr lang="en-US" dirty="0"/>
               <a:t>© ETSI 2015. All rights reserved</a:t>
             </a:r>
           </a:p>
@@ -5752,7 +5752,7 @@
               <a:pPr/>
               <a:t>‹N›</a:t>
             </a:fld>
-            <a:endParaRPr lang="en-US"/>
+            <a:endParaRPr lang="en-US" dirty="0"/>
           </a:p>
         </p:txBody>
       </p:sp>
@@ -5785,7 +5785,7 @@
               <a:defRPr/>
             </a:pPr>
             <a:r>
-              <a:rPr lang="en-US"/>
+              <a:rPr lang="en-US" dirty="0"/>
               <a:t>© ETSI 2015. All rights reserved</a:t>
             </a:r>
           </a:p>
@@ -6032,7 +6032,7 @@
               <a:pPr/>
               <a:t>‹N›</a:t>
             </a:fld>
-            <a:endParaRPr lang="en-US"/>
+            <a:endParaRPr lang="en-US" dirty="0"/>
           </a:p>
         </p:txBody>
       </p:sp>
@@ -6065,7 +6065,7 @@
               <a:defRPr/>
             </a:pPr>
             <a:r>
-              <a:rPr lang="en-US"/>
+              <a:rPr lang="en-US" dirty="0"/>
               <a:t>© ETSI 2015. All rights reserved</a:t>
             </a:r>
           </a:p>
@@ -6271,9 +6271,9 @@
             <a:fld id="{3D599013-5C43-42B3-986A-3CF64AAE02B4}" type="datetimeFigureOut">
               <a:rPr lang="en-US" smtClean="0"/>
               <a:pPr/>
-              <a:t>10/24/2016</a:t>
+              <a:t>10/27/2016</a:t>
             </a:fld>
-            <a:endParaRPr lang="en-US"/>
+            <a:endParaRPr lang="en-US" dirty="0"/>
           </a:p>
         </p:txBody>
       </p:sp>
@@ -6292,7 +6292,7 @@
           <a:bodyPr/>
           <a:lstStyle/>
           <a:p>
-            <a:endParaRPr lang="en-US"/>
+            <a:endParaRPr lang="en-US" dirty="0"/>
           </a:p>
         </p:txBody>
       </p:sp>
@@ -6316,7 +6316,7 @@
               <a:pPr/>
               <a:t>‹N›</a:t>
             </a:fld>
-            <a:endParaRPr lang="en-US"/>
+            <a:endParaRPr lang="en-US" dirty="0"/>
           </a:p>
         </p:txBody>
       </p:sp>
@@ -6558,7 +6558,7 @@
               <a:pPr/>
               <a:t>‹N›</a:t>
             </a:fld>
-            <a:endParaRPr lang="en-US"/>
+            <a:endParaRPr lang="en-US" dirty="0"/>
           </a:p>
         </p:txBody>
       </p:sp>
@@ -6591,7 +6591,7 @@
               <a:defRPr/>
             </a:pPr>
             <a:r>
-              <a:rPr lang="en-US"/>
+              <a:rPr lang="en-US" dirty="0"/>
               <a:t>© ETSI 2015. All rights reserved</a:t>
             </a:r>
           </a:p>
@@ -6765,7 +6765,7 @@
               <a:defRPr/>
             </a:pPr>
             <a:r>
-              <a:rPr lang="en-US"/>
+              <a:rPr lang="en-US" dirty="0"/>
               <a:t>© ETSI 2015. All rights reserved</a:t>
             </a:r>
           </a:p>
@@ -6795,7 +6795,7 @@
               <a:pPr/>
               <a:t>‹N›</a:t>
             </a:fld>
-            <a:endParaRPr lang="en-US"/>
+            <a:endParaRPr lang="en-US" dirty="0"/>
           </a:p>
         </p:txBody>
       </p:sp>
@@ -6987,9 +6987,9 @@
             <a:fld id="{3D599013-5C43-42B3-986A-3CF64AAE02B4}" type="datetimeFigureOut">
               <a:rPr lang="en-US" smtClean="0"/>
               <a:pPr/>
-              <a:t>10/24/2016</a:t>
+              <a:t>10/27/2016</a:t>
             </a:fld>
-            <a:endParaRPr lang="en-US"/>
+            <a:endParaRPr lang="en-US" dirty="0"/>
           </a:p>
         </p:txBody>
       </p:sp>
@@ -7008,7 +7008,7 @@
           <a:bodyPr/>
           <a:lstStyle/>
           <a:p>
-            <a:endParaRPr lang="en-US"/>
+            <a:endParaRPr lang="en-US" dirty="0"/>
           </a:p>
         </p:txBody>
       </p:sp>
@@ -7032,7 +7032,7 @@
               <a:pPr/>
               <a:t>‹N›</a:t>
             </a:fld>
-            <a:endParaRPr lang="en-US"/>
+            <a:endParaRPr lang="en-US" dirty="0"/>
           </a:p>
         </p:txBody>
       </p:sp>
@@ -7356,9 +7356,9 @@
             <a:fld id="{3D599013-5C43-42B3-986A-3CF64AAE02B4}" type="datetimeFigureOut">
               <a:rPr lang="en-US" smtClean="0"/>
               <a:pPr/>
-              <a:t>10/24/2016</a:t>
+              <a:t>10/27/2016</a:t>
             </a:fld>
-            <a:endParaRPr lang="en-US"/>
+            <a:endParaRPr lang="en-US" dirty="0"/>
           </a:p>
         </p:txBody>
       </p:sp>
@@ -7377,7 +7377,7 @@
           <a:bodyPr/>
           <a:lstStyle/>
           <a:p>
-            <a:endParaRPr lang="en-US"/>
+            <a:endParaRPr lang="en-US" dirty="0"/>
           </a:p>
         </p:txBody>
       </p:sp>
@@ -7401,7 +7401,7 @@
               <a:pPr/>
               <a:t>‹N›</a:t>
             </a:fld>
-            <a:endParaRPr lang="en-US"/>
+            <a:endParaRPr lang="en-US" dirty="0"/>
           </a:p>
         </p:txBody>
       </p:sp>
@@ -7476,9 +7476,9 @@
             <a:fld id="{3D599013-5C43-42B3-986A-3CF64AAE02B4}" type="datetimeFigureOut">
               <a:rPr lang="en-US" smtClean="0"/>
               <a:pPr/>
-              <a:t>10/24/2016</a:t>
+              <a:t>10/27/2016</a:t>
             </a:fld>
-            <a:endParaRPr lang="en-US"/>
+            <a:endParaRPr lang="en-US" dirty="0"/>
           </a:p>
         </p:txBody>
       </p:sp>
@@ -7497,7 +7497,7 @@
           <a:bodyPr/>
           <a:lstStyle/>
           <a:p>
-            <a:endParaRPr lang="en-US"/>
+            <a:endParaRPr lang="en-US" dirty="0"/>
           </a:p>
         </p:txBody>
       </p:sp>
@@ -7521,7 +7521,7 @@
               <a:pPr/>
               <a:t>‹N›</a:t>
             </a:fld>
-            <a:endParaRPr lang="en-US"/>
+            <a:endParaRPr lang="en-US" dirty="0"/>
           </a:p>
         </p:txBody>
       </p:sp>
@@ -7573,9 +7573,9 @@
             <a:fld id="{3D599013-5C43-42B3-986A-3CF64AAE02B4}" type="datetimeFigureOut">
               <a:rPr lang="en-US" smtClean="0"/>
               <a:pPr/>
-              <a:t>10/24/2016</a:t>
+              <a:t>10/27/2016</a:t>
             </a:fld>
-            <a:endParaRPr lang="en-US"/>
+            <a:endParaRPr lang="en-US" dirty="0"/>
           </a:p>
         </p:txBody>
       </p:sp>
@@ -7594,7 +7594,7 @@
           <a:bodyPr/>
           <a:lstStyle/>
           <a:p>
-            <a:endParaRPr lang="en-US"/>
+            <a:endParaRPr lang="en-US" dirty="0"/>
           </a:p>
         </p:txBody>
       </p:sp>
@@ -7618,7 +7618,7 @@
               <a:pPr/>
               <a:t>‹N›</a:t>
             </a:fld>
-            <a:endParaRPr lang="en-US"/>
+            <a:endParaRPr lang="en-US" dirty="0"/>
           </a:p>
         </p:txBody>
       </p:sp>
@@ -7852,9 +7852,9 @@
             <a:fld id="{3D599013-5C43-42B3-986A-3CF64AAE02B4}" type="datetimeFigureOut">
               <a:rPr lang="en-US" smtClean="0"/>
               <a:pPr/>
-              <a:t>10/24/2016</a:t>
+              <a:t>10/27/2016</a:t>
             </a:fld>
-            <a:endParaRPr lang="en-US"/>
+            <a:endParaRPr lang="en-US" dirty="0"/>
           </a:p>
         </p:txBody>
       </p:sp>
@@ -7873,7 +7873,7 @@
           <a:bodyPr/>
           <a:lstStyle/>
           <a:p>
-            <a:endParaRPr lang="en-US"/>
+            <a:endParaRPr lang="en-US" dirty="0"/>
           </a:p>
         </p:txBody>
       </p:sp>
@@ -7897,7 +7897,7 @@
               <a:pPr/>
               <a:t>‹N›</a:t>
             </a:fld>
-            <a:endParaRPr lang="en-US"/>
+            <a:endParaRPr lang="en-US" dirty="0"/>
           </a:p>
         </p:txBody>
       </p:sp>
@@ -8021,10 +8021,9 @@
           </a:lstStyle>
           <a:p>
             <a:r>
-              <a:rPr lang="en-US"/>
+              <a:rPr lang="en-US" dirty="0"/>
               <a:t>Click icon to add picture</a:t>
             </a:r>
-            <a:endParaRPr lang="en-US" dirty="0"/>
           </a:p>
         </p:txBody>
       </p:sp>
@@ -8111,9 +8110,9 @@
             <a:fld id="{3D599013-5C43-42B3-986A-3CF64AAE02B4}" type="datetimeFigureOut">
               <a:rPr lang="en-US" smtClean="0"/>
               <a:pPr/>
-              <a:t>10/24/2016</a:t>
+              <a:t>10/27/2016</a:t>
             </a:fld>
-            <a:endParaRPr lang="en-US"/>
+            <a:endParaRPr lang="en-US" dirty="0"/>
           </a:p>
         </p:txBody>
       </p:sp>
@@ -8132,7 +8131,7 @@
           <a:bodyPr/>
           <a:lstStyle/>
           <a:p>
-            <a:endParaRPr lang="en-US"/>
+            <a:endParaRPr lang="en-US" dirty="0"/>
           </a:p>
         </p:txBody>
       </p:sp>
@@ -8156,7 +8155,7 @@
               <a:pPr/>
               <a:t>‹N›</a:t>
             </a:fld>
-            <a:endParaRPr lang="en-US"/>
+            <a:endParaRPr lang="en-US" dirty="0"/>
           </a:p>
         </p:txBody>
       </p:sp>
@@ -8326,9 +8325,9 @@
             <a:fld id="{3D599013-5C43-42B3-986A-3CF64AAE02B4}" type="datetimeFigureOut">
               <a:rPr lang="en-US" smtClean="0"/>
               <a:pPr/>
-              <a:t>10/24/2016</a:t>
+              <a:t>10/27/2016</a:t>
             </a:fld>
-            <a:endParaRPr lang="en-US"/>
+            <a:endParaRPr lang="en-US" dirty="0"/>
           </a:p>
         </p:txBody>
       </p:sp>
@@ -8365,7 +8364,7 @@
             </a:lvl1pPr>
           </a:lstStyle>
           <a:p>
-            <a:endParaRPr lang="en-US"/>
+            <a:endParaRPr lang="en-US" dirty="0"/>
           </a:p>
         </p:txBody>
       </p:sp>
@@ -8407,7 +8406,7 @@
               <a:pPr/>
               <a:t>‹N›</a:t>
             </a:fld>
-            <a:endParaRPr lang="en-US"/>
+            <a:endParaRPr lang="en-US" dirty="0"/>
           </a:p>
         </p:txBody>
       </p:sp>
@@ -8865,9 +8864,9 @@
           <a:p>
             <a:fld id="{3F96F2D7-2467-4E8E-B24B-63336E0458CC}" type="datetimeFigureOut">
               <a:rPr lang="it-IT" smtClean="0"/>
-              <a:t>24/10/2016</a:t>
+              <a:t>27/10/2016</a:t>
             </a:fld>
-            <a:endParaRPr lang="it-IT"/>
+            <a:endParaRPr lang="it-IT" dirty="0"/>
           </a:p>
         </p:txBody>
       </p:sp>
@@ -8908,7 +8907,7 @@
               <a:defRPr/>
             </a:pPr>
             <a:r>
-              <a:rPr lang="en-US"/>
+              <a:rPr lang="en-US" dirty="0"/>
               <a:t>© ETSI 2015. All rights reserved</a:t>
             </a:r>
           </a:p>
@@ -8952,7 +8951,7 @@
               <a:pPr/>
               <a:t>‹N›</a:t>
             </a:fld>
-            <a:endParaRPr lang="en-US"/>
+            <a:endParaRPr lang="en-US" dirty="0"/>
           </a:p>
         </p:txBody>
       </p:sp>
@@ -23830,6 +23829,927 @@
     <p:extLst>
       <p:ext uri="{BB962C8B-B14F-4D97-AF65-F5344CB8AC3E}">
         <p14:creationId xmlns:p14="http://schemas.microsoft.com/office/powerpoint/2010/main" val="529406174"/>
+      </p:ext>
+    </p:extLst>
+  </p:cSld>
+  <p:clrMapOvr>
+    <a:masterClrMapping/>
+  </p:clrMapOvr>
+  <p:transition>
+    <p:wipe dir="r"/>
+  </p:transition>
+</p:sld>
+</file>
+
+<file path=ppt/slides/slide14.xml><?xml version="1.0" encoding="utf-8"?>
+<p:sld xmlns:a="http://schemas.openxmlformats.org/drawingml/2006/main" xmlns:r="http://schemas.openxmlformats.org/officeDocument/2006/relationships" xmlns:p="http://schemas.openxmlformats.org/presentationml/2006/main">
+  <p:cSld>
+    <p:spTree>
+      <p:nvGrpSpPr>
+        <p:cNvPr id="1" name=""/>
+        <p:cNvGrpSpPr/>
+        <p:nvPr/>
+      </p:nvGrpSpPr>
+      <p:grpSpPr>
+        <a:xfrm>
+          <a:off x="0" y="0"/>
+          <a:ext cx="0" cy="0"/>
+          <a:chOff x="0" y="0"/>
+          <a:chExt cx="0" cy="0"/>
+        </a:xfrm>
+      </p:grpSpPr>
+      <p:pic>
+        <p:nvPicPr>
+          <p:cNvPr id="4" name="Picture 280"/>
+          <p:cNvPicPr>
+            <a:picLocks noChangeAspect="1"/>
+          </p:cNvPicPr>
+          <p:nvPr/>
+        </p:nvPicPr>
+        <p:blipFill>
+          <a:blip r:embed="rId2" cstate="print">
+            <a:extLst>
+              <a:ext uri="{28A0092B-C50C-407E-A947-70E740481C1C}">
+                <a14:useLocalDpi xmlns:a14="http://schemas.microsoft.com/office/drawing/2010/main" val="0"/>
+              </a:ext>
+            </a:extLst>
+          </a:blip>
+          <a:stretch>
+            <a:fillRect/>
+          </a:stretch>
+        </p:blipFill>
+        <p:spPr>
+          <a:xfrm>
+            <a:off x="2123728" y="548680"/>
+            <a:ext cx="303716" cy="507910"/>
+          </a:xfrm>
+          <a:prstGeom prst="rect">
+            <a:avLst/>
+          </a:prstGeom>
+        </p:spPr>
+      </p:pic>
+      <p:sp>
+        <p:nvSpPr>
+          <p:cNvPr id="5" name="CustomShape 2"/>
+          <p:cNvSpPr/>
+          <p:nvPr/>
+        </p:nvSpPr>
+        <p:spPr>
+          <a:xfrm>
+            <a:off x="1678048" y="1821965"/>
+            <a:ext cx="1179392" cy="359640"/>
+          </a:xfrm>
+          <a:prstGeom prst="rect">
+            <a:avLst/>
+          </a:prstGeom>
+          <a:solidFill>
+            <a:schemeClr val="accent1">
+              <a:lumMod val="20000"/>
+              <a:lumOff val="80000"/>
+            </a:schemeClr>
+          </a:solidFill>
+          <a:ln w="12700">
+            <a:solidFill>
+              <a:schemeClr val="tx1"/>
+            </a:solidFill>
+          </a:ln>
+          <a:effectLst>
+            <a:outerShdw blurRad="152400" dir="5400000" sx="90000" sy="-19000" rotWithShape="0">
+              <a:prstClr val="black">
+                <a:alpha val="15000"/>
+              </a:prstClr>
+            </a:outerShdw>
+          </a:effectLst>
+        </p:spPr>
+        <p:txBody>
+          <a:bodyPr wrap="none" lIns="90000" tIns="45000" rIns="90000" bIns="45000" anchor="ctr"/>
+          <a:lstStyle>
+            <a:defPPr>
+              <a:defRPr lang="en-US"/>
+            </a:defPPr>
+            <a:lvl1pPr marL="0" algn="l" defTabSz="914400" rtl="0" eaLnBrk="1" latinLnBrk="0" hangingPunct="1">
+              <a:defRPr sz="1800" kern="1200">
+                <a:solidFill>
+                  <a:schemeClr val="tx1"/>
+                </a:solidFill>
+                <a:latin typeface="+mn-lt"/>
+                <a:ea typeface="+mn-ea"/>
+                <a:cs typeface="+mn-cs"/>
+              </a:defRPr>
+            </a:lvl1pPr>
+            <a:lvl2pPr marL="457200" algn="l" defTabSz="914400" rtl="0" eaLnBrk="1" latinLnBrk="0" hangingPunct="1">
+              <a:defRPr sz="1800" kern="1200">
+                <a:solidFill>
+                  <a:schemeClr val="tx1"/>
+                </a:solidFill>
+                <a:latin typeface="+mn-lt"/>
+                <a:ea typeface="+mn-ea"/>
+                <a:cs typeface="+mn-cs"/>
+              </a:defRPr>
+            </a:lvl2pPr>
+            <a:lvl3pPr marL="914400" algn="l" defTabSz="914400" rtl="0" eaLnBrk="1" latinLnBrk="0" hangingPunct="1">
+              <a:defRPr sz="1800" kern="1200">
+                <a:solidFill>
+                  <a:schemeClr val="tx1"/>
+                </a:solidFill>
+                <a:latin typeface="+mn-lt"/>
+                <a:ea typeface="+mn-ea"/>
+                <a:cs typeface="+mn-cs"/>
+              </a:defRPr>
+            </a:lvl3pPr>
+            <a:lvl4pPr marL="1371600" algn="l" defTabSz="914400" rtl="0" eaLnBrk="1" latinLnBrk="0" hangingPunct="1">
+              <a:defRPr sz="1800" kern="1200">
+                <a:solidFill>
+                  <a:schemeClr val="tx1"/>
+                </a:solidFill>
+                <a:latin typeface="+mn-lt"/>
+                <a:ea typeface="+mn-ea"/>
+                <a:cs typeface="+mn-cs"/>
+              </a:defRPr>
+            </a:lvl4pPr>
+            <a:lvl5pPr marL="1828800" algn="l" defTabSz="914400" rtl="0" eaLnBrk="1" latinLnBrk="0" hangingPunct="1">
+              <a:defRPr sz="1800" kern="1200">
+                <a:solidFill>
+                  <a:schemeClr val="tx1"/>
+                </a:solidFill>
+                <a:latin typeface="+mn-lt"/>
+                <a:ea typeface="+mn-ea"/>
+                <a:cs typeface="+mn-cs"/>
+              </a:defRPr>
+            </a:lvl5pPr>
+            <a:lvl6pPr marL="2286000" algn="l" defTabSz="914400" rtl="0" eaLnBrk="1" latinLnBrk="0" hangingPunct="1">
+              <a:defRPr sz="1800" kern="1200">
+                <a:solidFill>
+                  <a:schemeClr val="tx1"/>
+                </a:solidFill>
+                <a:latin typeface="+mn-lt"/>
+                <a:ea typeface="+mn-ea"/>
+                <a:cs typeface="+mn-cs"/>
+              </a:defRPr>
+            </a:lvl6pPr>
+            <a:lvl7pPr marL="2743200" algn="l" defTabSz="914400" rtl="0" eaLnBrk="1" latinLnBrk="0" hangingPunct="1">
+              <a:defRPr sz="1800" kern="1200">
+                <a:solidFill>
+                  <a:schemeClr val="tx1"/>
+                </a:solidFill>
+                <a:latin typeface="+mn-lt"/>
+                <a:ea typeface="+mn-ea"/>
+                <a:cs typeface="+mn-cs"/>
+              </a:defRPr>
+            </a:lvl7pPr>
+            <a:lvl8pPr marL="3200400" algn="l" defTabSz="914400" rtl="0" eaLnBrk="1" latinLnBrk="0" hangingPunct="1">
+              <a:defRPr sz="1800" kern="1200">
+                <a:solidFill>
+                  <a:schemeClr val="tx1"/>
+                </a:solidFill>
+                <a:latin typeface="+mn-lt"/>
+                <a:ea typeface="+mn-ea"/>
+                <a:cs typeface="+mn-cs"/>
+              </a:defRPr>
+            </a:lvl8pPr>
+            <a:lvl9pPr marL="3657600" algn="l" defTabSz="914400" rtl="0" eaLnBrk="1" latinLnBrk="0" hangingPunct="1">
+              <a:defRPr sz="1800" kern="1200">
+                <a:solidFill>
+                  <a:schemeClr val="tx1"/>
+                </a:solidFill>
+                <a:latin typeface="+mn-lt"/>
+                <a:ea typeface="+mn-ea"/>
+                <a:cs typeface="+mn-cs"/>
+              </a:defRPr>
+            </a:lvl9pPr>
+          </a:lstStyle>
+          <a:p>
+            <a:pPr algn="ctr">
+              <a:lnSpc>
+                <a:spcPct val="100000"/>
+              </a:lnSpc>
+            </a:pPr>
+            <a:r>
+              <a:rPr lang="it-IT" sz="1400" dirty="0">
+                <a:cs typeface="Times New Roman" pitchFamily="18" charset="0"/>
+              </a:rPr>
+              <a:t>GUI</a:t>
+            </a:r>
+            <a:endParaRPr sz="1400" dirty="0">
+              <a:cs typeface="Times New Roman" pitchFamily="18" charset="0"/>
+            </a:endParaRPr>
+          </a:p>
+        </p:txBody>
+      </p:sp>
+      <p:sp>
+        <p:nvSpPr>
+          <p:cNvPr id="6" name="CustomShape 2"/>
+          <p:cNvSpPr/>
+          <p:nvPr/>
+        </p:nvSpPr>
+        <p:spPr>
+          <a:xfrm>
+            <a:off x="3766281" y="1821965"/>
+            <a:ext cx="1512168" cy="359640"/>
+          </a:xfrm>
+          <a:prstGeom prst="rect">
+            <a:avLst/>
+          </a:prstGeom>
+          <a:solidFill>
+            <a:schemeClr val="accent1">
+              <a:lumMod val="20000"/>
+              <a:lumOff val="80000"/>
+            </a:schemeClr>
+          </a:solidFill>
+          <a:ln w="12700">
+            <a:solidFill>
+              <a:schemeClr val="tx1"/>
+            </a:solidFill>
+          </a:ln>
+          <a:effectLst>
+            <a:outerShdw blurRad="152400" dir="5400000" sx="90000" sy="-19000" rotWithShape="0">
+              <a:prstClr val="black">
+                <a:alpha val="15000"/>
+              </a:prstClr>
+            </a:outerShdw>
+          </a:effectLst>
+        </p:spPr>
+        <p:txBody>
+          <a:bodyPr wrap="none" lIns="90000" tIns="45000" rIns="90000" bIns="45000" anchor="ctr"/>
+          <a:lstStyle>
+            <a:defPPr>
+              <a:defRPr lang="en-US"/>
+            </a:defPPr>
+            <a:lvl1pPr marL="0" algn="l" defTabSz="914400" rtl="0" eaLnBrk="1" latinLnBrk="0" hangingPunct="1">
+              <a:defRPr sz="1800" kern="1200">
+                <a:solidFill>
+                  <a:schemeClr val="tx1"/>
+                </a:solidFill>
+                <a:latin typeface="+mn-lt"/>
+                <a:ea typeface="+mn-ea"/>
+                <a:cs typeface="+mn-cs"/>
+              </a:defRPr>
+            </a:lvl1pPr>
+            <a:lvl2pPr marL="457200" algn="l" defTabSz="914400" rtl="0" eaLnBrk="1" latinLnBrk="0" hangingPunct="1">
+              <a:defRPr sz="1800" kern="1200">
+                <a:solidFill>
+                  <a:schemeClr val="tx1"/>
+                </a:solidFill>
+                <a:latin typeface="+mn-lt"/>
+                <a:ea typeface="+mn-ea"/>
+                <a:cs typeface="+mn-cs"/>
+              </a:defRPr>
+            </a:lvl2pPr>
+            <a:lvl3pPr marL="914400" algn="l" defTabSz="914400" rtl="0" eaLnBrk="1" latinLnBrk="0" hangingPunct="1">
+              <a:defRPr sz="1800" kern="1200">
+                <a:solidFill>
+                  <a:schemeClr val="tx1"/>
+                </a:solidFill>
+                <a:latin typeface="+mn-lt"/>
+                <a:ea typeface="+mn-ea"/>
+                <a:cs typeface="+mn-cs"/>
+              </a:defRPr>
+            </a:lvl3pPr>
+            <a:lvl4pPr marL="1371600" algn="l" defTabSz="914400" rtl="0" eaLnBrk="1" latinLnBrk="0" hangingPunct="1">
+              <a:defRPr sz="1800" kern="1200">
+                <a:solidFill>
+                  <a:schemeClr val="tx1"/>
+                </a:solidFill>
+                <a:latin typeface="+mn-lt"/>
+                <a:ea typeface="+mn-ea"/>
+                <a:cs typeface="+mn-cs"/>
+              </a:defRPr>
+            </a:lvl4pPr>
+            <a:lvl5pPr marL="1828800" algn="l" defTabSz="914400" rtl="0" eaLnBrk="1" latinLnBrk="0" hangingPunct="1">
+              <a:defRPr sz="1800" kern="1200">
+                <a:solidFill>
+                  <a:schemeClr val="tx1"/>
+                </a:solidFill>
+                <a:latin typeface="+mn-lt"/>
+                <a:ea typeface="+mn-ea"/>
+                <a:cs typeface="+mn-cs"/>
+              </a:defRPr>
+            </a:lvl5pPr>
+            <a:lvl6pPr marL="2286000" algn="l" defTabSz="914400" rtl="0" eaLnBrk="1" latinLnBrk="0" hangingPunct="1">
+              <a:defRPr sz="1800" kern="1200">
+                <a:solidFill>
+                  <a:schemeClr val="tx1"/>
+                </a:solidFill>
+                <a:latin typeface="+mn-lt"/>
+                <a:ea typeface="+mn-ea"/>
+                <a:cs typeface="+mn-cs"/>
+              </a:defRPr>
+            </a:lvl6pPr>
+            <a:lvl7pPr marL="2743200" algn="l" defTabSz="914400" rtl="0" eaLnBrk="1" latinLnBrk="0" hangingPunct="1">
+              <a:defRPr sz="1800" kern="1200">
+                <a:solidFill>
+                  <a:schemeClr val="tx1"/>
+                </a:solidFill>
+                <a:latin typeface="+mn-lt"/>
+                <a:ea typeface="+mn-ea"/>
+                <a:cs typeface="+mn-cs"/>
+              </a:defRPr>
+            </a:lvl7pPr>
+            <a:lvl8pPr marL="3200400" algn="l" defTabSz="914400" rtl="0" eaLnBrk="1" latinLnBrk="0" hangingPunct="1">
+              <a:defRPr sz="1800" kern="1200">
+                <a:solidFill>
+                  <a:schemeClr val="tx1"/>
+                </a:solidFill>
+                <a:latin typeface="+mn-lt"/>
+                <a:ea typeface="+mn-ea"/>
+                <a:cs typeface="+mn-cs"/>
+              </a:defRPr>
+            </a:lvl8pPr>
+            <a:lvl9pPr marL="3657600" algn="l" defTabSz="914400" rtl="0" eaLnBrk="1" latinLnBrk="0" hangingPunct="1">
+              <a:defRPr sz="1800" kern="1200">
+                <a:solidFill>
+                  <a:schemeClr val="tx1"/>
+                </a:solidFill>
+                <a:latin typeface="+mn-lt"/>
+                <a:ea typeface="+mn-ea"/>
+                <a:cs typeface="+mn-cs"/>
+              </a:defRPr>
+            </a:lvl9pPr>
+          </a:lstStyle>
+          <a:p>
+            <a:pPr algn="ctr">
+              <a:lnSpc>
+                <a:spcPct val="100000"/>
+              </a:lnSpc>
+            </a:pPr>
+            <a:r>
+              <a:rPr lang="it-IT" sz="1400" dirty="0">
+                <a:cs typeface="Times New Roman" pitchFamily="18" charset="0"/>
+              </a:rPr>
+              <a:t>VNF-Repository</a:t>
+            </a:r>
+            <a:endParaRPr sz="1400" dirty="0">
+              <a:cs typeface="Times New Roman" pitchFamily="18" charset="0"/>
+            </a:endParaRPr>
+          </a:p>
+        </p:txBody>
+      </p:sp>
+      <p:sp>
+        <p:nvSpPr>
+          <p:cNvPr id="7" name="CustomShape 2"/>
+          <p:cNvSpPr/>
+          <p:nvPr/>
+        </p:nvSpPr>
+        <p:spPr>
+          <a:xfrm>
+            <a:off x="1544769" y="3068959"/>
+            <a:ext cx="1445950" cy="359640"/>
+          </a:xfrm>
+          <a:prstGeom prst="rect">
+            <a:avLst/>
+          </a:prstGeom>
+          <a:solidFill>
+            <a:schemeClr val="accent1">
+              <a:lumMod val="20000"/>
+              <a:lumOff val="80000"/>
+            </a:schemeClr>
+          </a:solidFill>
+          <a:ln w="12700">
+            <a:solidFill>
+              <a:schemeClr val="tx1"/>
+            </a:solidFill>
+          </a:ln>
+          <a:effectLst>
+            <a:outerShdw blurRad="152400" dir="5400000" sx="90000" sy="-19000" rotWithShape="0">
+              <a:prstClr val="black">
+                <a:alpha val="15000"/>
+              </a:prstClr>
+            </a:outerShdw>
+          </a:effectLst>
+        </p:spPr>
+        <p:txBody>
+          <a:bodyPr wrap="none" lIns="90000" tIns="45000" rIns="90000" bIns="45000" anchor="ctr"/>
+          <a:lstStyle>
+            <a:defPPr>
+              <a:defRPr lang="en-US"/>
+            </a:defPPr>
+            <a:lvl1pPr marL="0" algn="l" defTabSz="914400" rtl="0" eaLnBrk="1" latinLnBrk="0" hangingPunct="1">
+              <a:defRPr sz="1800" kern="1200">
+                <a:solidFill>
+                  <a:schemeClr val="tx1"/>
+                </a:solidFill>
+                <a:latin typeface="+mn-lt"/>
+                <a:ea typeface="+mn-ea"/>
+                <a:cs typeface="+mn-cs"/>
+              </a:defRPr>
+            </a:lvl1pPr>
+            <a:lvl2pPr marL="457200" algn="l" defTabSz="914400" rtl="0" eaLnBrk="1" latinLnBrk="0" hangingPunct="1">
+              <a:defRPr sz="1800" kern="1200">
+                <a:solidFill>
+                  <a:schemeClr val="tx1"/>
+                </a:solidFill>
+                <a:latin typeface="+mn-lt"/>
+                <a:ea typeface="+mn-ea"/>
+                <a:cs typeface="+mn-cs"/>
+              </a:defRPr>
+            </a:lvl2pPr>
+            <a:lvl3pPr marL="914400" algn="l" defTabSz="914400" rtl="0" eaLnBrk="1" latinLnBrk="0" hangingPunct="1">
+              <a:defRPr sz="1800" kern="1200">
+                <a:solidFill>
+                  <a:schemeClr val="tx1"/>
+                </a:solidFill>
+                <a:latin typeface="+mn-lt"/>
+                <a:ea typeface="+mn-ea"/>
+                <a:cs typeface="+mn-cs"/>
+              </a:defRPr>
+            </a:lvl3pPr>
+            <a:lvl4pPr marL="1371600" algn="l" defTabSz="914400" rtl="0" eaLnBrk="1" latinLnBrk="0" hangingPunct="1">
+              <a:defRPr sz="1800" kern="1200">
+                <a:solidFill>
+                  <a:schemeClr val="tx1"/>
+                </a:solidFill>
+                <a:latin typeface="+mn-lt"/>
+                <a:ea typeface="+mn-ea"/>
+                <a:cs typeface="+mn-cs"/>
+              </a:defRPr>
+            </a:lvl4pPr>
+            <a:lvl5pPr marL="1828800" algn="l" defTabSz="914400" rtl="0" eaLnBrk="1" latinLnBrk="0" hangingPunct="1">
+              <a:defRPr sz="1800" kern="1200">
+                <a:solidFill>
+                  <a:schemeClr val="tx1"/>
+                </a:solidFill>
+                <a:latin typeface="+mn-lt"/>
+                <a:ea typeface="+mn-ea"/>
+                <a:cs typeface="+mn-cs"/>
+              </a:defRPr>
+            </a:lvl5pPr>
+            <a:lvl6pPr marL="2286000" algn="l" defTabSz="914400" rtl="0" eaLnBrk="1" latinLnBrk="0" hangingPunct="1">
+              <a:defRPr sz="1800" kern="1200">
+                <a:solidFill>
+                  <a:schemeClr val="tx1"/>
+                </a:solidFill>
+                <a:latin typeface="+mn-lt"/>
+                <a:ea typeface="+mn-ea"/>
+                <a:cs typeface="+mn-cs"/>
+              </a:defRPr>
+            </a:lvl6pPr>
+            <a:lvl7pPr marL="2743200" algn="l" defTabSz="914400" rtl="0" eaLnBrk="1" latinLnBrk="0" hangingPunct="1">
+              <a:defRPr sz="1800" kern="1200">
+                <a:solidFill>
+                  <a:schemeClr val="tx1"/>
+                </a:solidFill>
+                <a:latin typeface="+mn-lt"/>
+                <a:ea typeface="+mn-ea"/>
+                <a:cs typeface="+mn-cs"/>
+              </a:defRPr>
+            </a:lvl7pPr>
+            <a:lvl8pPr marL="3200400" algn="l" defTabSz="914400" rtl="0" eaLnBrk="1" latinLnBrk="0" hangingPunct="1">
+              <a:defRPr sz="1800" kern="1200">
+                <a:solidFill>
+                  <a:schemeClr val="tx1"/>
+                </a:solidFill>
+                <a:latin typeface="+mn-lt"/>
+                <a:ea typeface="+mn-ea"/>
+                <a:cs typeface="+mn-cs"/>
+              </a:defRPr>
+            </a:lvl8pPr>
+            <a:lvl9pPr marL="3657600" algn="l" defTabSz="914400" rtl="0" eaLnBrk="1" latinLnBrk="0" hangingPunct="1">
+              <a:defRPr sz="1800" kern="1200">
+                <a:solidFill>
+                  <a:schemeClr val="tx1"/>
+                </a:solidFill>
+                <a:latin typeface="+mn-lt"/>
+                <a:ea typeface="+mn-ea"/>
+                <a:cs typeface="+mn-cs"/>
+              </a:defRPr>
+            </a:lvl9pPr>
+          </a:lstStyle>
+          <a:p>
+            <a:pPr algn="ctr">
+              <a:lnSpc>
+                <a:spcPct val="100000"/>
+              </a:lnSpc>
+            </a:pPr>
+            <a:r>
+              <a:rPr lang="it-IT" sz="1400" dirty="0">
+                <a:cs typeface="Times New Roman" pitchFamily="18" charset="0"/>
+              </a:rPr>
+              <a:t>Universal-node</a:t>
+            </a:r>
+            <a:endParaRPr sz="1400" dirty="0">
+              <a:cs typeface="Times New Roman" pitchFamily="18" charset="0"/>
+            </a:endParaRPr>
+          </a:p>
+        </p:txBody>
+      </p:sp>
+      <p:cxnSp>
+        <p:nvCxnSpPr>
+          <p:cNvPr id="8" name="Connettore 2 7"/>
+          <p:cNvCxnSpPr/>
+          <p:nvPr/>
+        </p:nvCxnSpPr>
+        <p:spPr>
+          <a:xfrm flipV="1">
+            <a:off x="2267744" y="1124744"/>
+            <a:ext cx="0" cy="576064"/>
+          </a:xfrm>
+          <a:prstGeom prst="straightConnector1">
+            <a:avLst/>
+          </a:prstGeom>
+          <a:ln w="28575">
+            <a:headEnd type="triangle"/>
+            <a:tailEnd type="triangle"/>
+          </a:ln>
+          <a:effectLst/>
+        </p:spPr>
+        <p:style>
+          <a:lnRef idx="1">
+            <a:schemeClr val="accent2"/>
+          </a:lnRef>
+          <a:fillRef idx="0">
+            <a:schemeClr val="accent2"/>
+          </a:fillRef>
+          <a:effectRef idx="0">
+            <a:schemeClr val="accent2"/>
+          </a:effectRef>
+          <a:fontRef idx="minor">
+            <a:schemeClr val="tx1"/>
+          </a:fontRef>
+        </p:style>
+      </p:cxnSp>
+      <p:cxnSp>
+        <p:nvCxnSpPr>
+          <p:cNvPr id="12" name="Connettore 2 11"/>
+          <p:cNvCxnSpPr/>
+          <p:nvPr/>
+        </p:nvCxnSpPr>
+        <p:spPr>
+          <a:xfrm flipH="1" flipV="1">
+            <a:off x="2275428" y="2265242"/>
+            <a:ext cx="158" cy="720080"/>
+          </a:xfrm>
+          <a:prstGeom prst="straightConnector1">
+            <a:avLst/>
+          </a:prstGeom>
+          <a:ln w="28575">
+            <a:headEnd type="triangle"/>
+            <a:tailEnd type="triangle"/>
+          </a:ln>
+          <a:effectLst/>
+        </p:spPr>
+        <p:style>
+          <a:lnRef idx="1">
+            <a:schemeClr val="accent2"/>
+          </a:lnRef>
+          <a:fillRef idx="0">
+            <a:schemeClr val="accent2"/>
+          </a:fillRef>
+          <a:effectRef idx="0">
+            <a:schemeClr val="accent2"/>
+          </a:effectRef>
+          <a:fontRef idx="minor">
+            <a:schemeClr val="tx1"/>
+          </a:fontRef>
+        </p:style>
+      </p:cxnSp>
+      <p:cxnSp>
+        <p:nvCxnSpPr>
+          <p:cNvPr id="14" name="Connettore 2 13"/>
+          <p:cNvCxnSpPr/>
+          <p:nvPr/>
+        </p:nvCxnSpPr>
+        <p:spPr>
+          <a:xfrm flipH="1">
+            <a:off x="2915817" y="1988840"/>
+            <a:ext cx="792087" cy="0"/>
+          </a:xfrm>
+          <a:prstGeom prst="straightConnector1">
+            <a:avLst/>
+          </a:prstGeom>
+          <a:ln w="28575">
+            <a:headEnd type="triangle"/>
+            <a:tailEnd type="triangle"/>
+          </a:ln>
+          <a:effectLst/>
+        </p:spPr>
+        <p:style>
+          <a:lnRef idx="1">
+            <a:schemeClr val="accent2"/>
+          </a:lnRef>
+          <a:fillRef idx="0">
+            <a:schemeClr val="accent2"/>
+          </a:fillRef>
+          <a:effectRef idx="0">
+            <a:schemeClr val="accent2"/>
+          </a:effectRef>
+          <a:fontRef idx="minor">
+            <a:schemeClr val="tx1"/>
+          </a:fontRef>
+        </p:style>
+      </p:cxnSp>
+      <p:sp>
+        <p:nvSpPr>
+          <p:cNvPr id="18" name="Rettangolo 17"/>
+          <p:cNvSpPr/>
+          <p:nvPr/>
+        </p:nvSpPr>
+        <p:spPr>
+          <a:xfrm>
+            <a:off x="899592" y="1412776"/>
+            <a:ext cx="4896544" cy="2376264"/>
+          </a:xfrm>
+          <a:prstGeom prst="rect">
+            <a:avLst/>
+          </a:prstGeom>
+          <a:noFill/>
+          <a:ln cmpd="dbl">
+            <a:solidFill>
+              <a:schemeClr val="accent1">
+                <a:shade val="50000"/>
+              </a:schemeClr>
+            </a:solidFill>
+            <a:prstDash val="dash"/>
+          </a:ln>
+        </p:spPr>
+        <p:style>
+          <a:lnRef idx="2">
+            <a:schemeClr val="accent1">
+              <a:shade val="50000"/>
+            </a:schemeClr>
+          </a:lnRef>
+          <a:fillRef idx="1">
+            <a:schemeClr val="accent1"/>
+          </a:fillRef>
+          <a:effectRef idx="0">
+            <a:schemeClr val="accent1"/>
+          </a:effectRef>
+          <a:fontRef idx="minor">
+            <a:schemeClr val="lt1"/>
+          </a:fontRef>
+        </p:style>
+        <p:txBody>
+          <a:bodyPr rtlCol="0" anchor="ctr"/>
+          <a:lstStyle/>
+          <a:p>
+            <a:pPr algn="ctr"/>
+            <a:endParaRPr lang="it-IT" dirty="0"/>
+          </a:p>
+        </p:txBody>
+      </p:sp>
+      <p:sp>
+        <p:nvSpPr>
+          <p:cNvPr id="19" name="Ovale 18"/>
+          <p:cNvSpPr/>
+          <p:nvPr/>
+        </p:nvSpPr>
+        <p:spPr>
+          <a:xfrm>
+            <a:off x="1979712" y="4509118"/>
+            <a:ext cx="360040" cy="360040"/>
+          </a:xfrm>
+          <a:prstGeom prst="ellipse">
+            <a:avLst/>
+          </a:prstGeom>
+        </p:spPr>
+        <p:style>
+          <a:lnRef idx="2">
+            <a:schemeClr val="accent1">
+              <a:shade val="50000"/>
+            </a:schemeClr>
+          </a:lnRef>
+          <a:fillRef idx="1">
+            <a:schemeClr val="accent1"/>
+          </a:fillRef>
+          <a:effectRef idx="0">
+            <a:schemeClr val="accent1"/>
+          </a:effectRef>
+          <a:fontRef idx="minor">
+            <a:schemeClr val="lt1"/>
+          </a:fontRef>
+        </p:style>
+        <p:txBody>
+          <a:bodyPr rtlCol="0" anchor="ctr"/>
+          <a:lstStyle/>
+          <a:p>
+            <a:pPr algn="ctr"/>
+            <a:endParaRPr lang="it-IT" dirty="0"/>
+          </a:p>
+        </p:txBody>
+      </p:sp>
+      <p:sp>
+        <p:nvSpPr>
+          <p:cNvPr id="20" name="Ovale 19"/>
+          <p:cNvSpPr/>
+          <p:nvPr/>
+        </p:nvSpPr>
+        <p:spPr>
+          <a:xfrm>
+            <a:off x="5616116" y="4509096"/>
+            <a:ext cx="360040" cy="360040"/>
+          </a:xfrm>
+          <a:prstGeom prst="ellipse">
+            <a:avLst/>
+          </a:prstGeom>
+        </p:spPr>
+        <p:style>
+          <a:lnRef idx="2">
+            <a:schemeClr val="accent1">
+              <a:shade val="50000"/>
+            </a:schemeClr>
+          </a:lnRef>
+          <a:fillRef idx="1">
+            <a:schemeClr val="accent1"/>
+          </a:fillRef>
+          <a:effectRef idx="0">
+            <a:schemeClr val="accent1"/>
+          </a:effectRef>
+          <a:fontRef idx="minor">
+            <a:schemeClr val="lt1"/>
+          </a:fontRef>
+        </p:style>
+        <p:txBody>
+          <a:bodyPr rtlCol="0" anchor="ctr"/>
+          <a:lstStyle/>
+          <a:p>
+            <a:pPr algn="ctr"/>
+            <a:endParaRPr lang="it-IT" dirty="0"/>
+          </a:p>
+        </p:txBody>
+      </p:sp>
+      <p:sp>
+        <p:nvSpPr>
+          <p:cNvPr id="21" name="Rettangolo 20"/>
+          <p:cNvSpPr/>
+          <p:nvPr/>
+        </p:nvSpPr>
+        <p:spPr>
+          <a:xfrm>
+            <a:off x="3401870" y="4473127"/>
+            <a:ext cx="1152128" cy="432024"/>
+          </a:xfrm>
+          <a:prstGeom prst="rect">
+            <a:avLst/>
+          </a:prstGeom>
+        </p:spPr>
+        <p:style>
+          <a:lnRef idx="2">
+            <a:schemeClr val="accent6">
+              <a:shade val="50000"/>
+            </a:schemeClr>
+          </a:lnRef>
+          <a:fillRef idx="1">
+            <a:schemeClr val="accent6"/>
+          </a:fillRef>
+          <a:effectRef idx="0">
+            <a:schemeClr val="accent6"/>
+          </a:effectRef>
+          <a:fontRef idx="minor">
+            <a:schemeClr val="lt1"/>
+          </a:fontRef>
+        </p:style>
+        <p:txBody>
+          <a:bodyPr rtlCol="0" anchor="ctr"/>
+          <a:lstStyle/>
+          <a:p>
+            <a:pPr algn="ctr"/>
+            <a:r>
+              <a:rPr lang="it-IT" sz="1500" dirty="0"/>
+              <a:t>firewall</a:t>
+            </a:r>
+          </a:p>
+        </p:txBody>
+      </p:sp>
+      <p:cxnSp>
+        <p:nvCxnSpPr>
+          <p:cNvPr id="23" name="Connettore diritto 22"/>
+          <p:cNvCxnSpPr>
+            <a:stCxn id="19" idx="6"/>
+            <a:endCxn id="21" idx="1"/>
+          </p:cNvCxnSpPr>
+          <p:nvPr/>
+        </p:nvCxnSpPr>
+        <p:spPr>
+          <a:xfrm>
+            <a:off x="2339752" y="4689138"/>
+            <a:ext cx="1062118" cy="1"/>
+          </a:xfrm>
+          <a:prstGeom prst="line">
+            <a:avLst/>
+          </a:prstGeom>
+          <a:ln w="12700"/>
+        </p:spPr>
+        <p:style>
+          <a:lnRef idx="1">
+            <a:schemeClr val="dk1"/>
+          </a:lnRef>
+          <a:fillRef idx="0">
+            <a:schemeClr val="dk1"/>
+          </a:fillRef>
+          <a:effectRef idx="0">
+            <a:schemeClr val="dk1"/>
+          </a:effectRef>
+          <a:fontRef idx="minor">
+            <a:schemeClr val="tx1"/>
+          </a:fontRef>
+        </p:style>
+      </p:cxnSp>
+      <p:cxnSp>
+        <p:nvCxnSpPr>
+          <p:cNvPr id="24" name="Connettore diritto 23"/>
+          <p:cNvCxnSpPr/>
+          <p:nvPr/>
+        </p:nvCxnSpPr>
+        <p:spPr>
+          <a:xfrm>
+            <a:off x="4553998" y="4689115"/>
+            <a:ext cx="1062118" cy="1"/>
+          </a:xfrm>
+          <a:prstGeom prst="line">
+            <a:avLst/>
+          </a:prstGeom>
+          <a:ln w="12700"/>
+        </p:spPr>
+        <p:style>
+          <a:lnRef idx="1">
+            <a:schemeClr val="dk1"/>
+          </a:lnRef>
+          <a:fillRef idx="0">
+            <a:schemeClr val="dk1"/>
+          </a:fillRef>
+          <a:effectRef idx="0">
+            <a:schemeClr val="dk1"/>
+          </a:effectRef>
+          <a:fontRef idx="minor">
+            <a:schemeClr val="tx1"/>
+          </a:fontRef>
+        </p:style>
+      </p:cxnSp>
+      <p:sp>
+        <p:nvSpPr>
+          <p:cNvPr id="25" name="CasellaDiTesto 24"/>
+          <p:cNvSpPr txBox="1"/>
+          <p:nvPr/>
+        </p:nvSpPr>
+        <p:spPr>
+          <a:xfrm>
+            <a:off x="5560751" y="4869136"/>
+            <a:ext cx="470770" cy="276999"/>
+          </a:xfrm>
+          <a:prstGeom prst="rect">
+            <a:avLst/>
+          </a:prstGeom>
+          <a:noFill/>
+        </p:spPr>
+        <p:txBody>
+          <a:bodyPr wrap="none" rtlCol="0">
+            <a:spAutoFit/>
+          </a:bodyPr>
+          <a:lstStyle/>
+          <a:p>
+            <a:pPr algn="ctr"/>
+            <a:r>
+              <a:rPr lang="it-IT" sz="1200" dirty="0">
+                <a:solidFill>
+                  <a:schemeClr val="bg1">
+                    <a:lumMod val="65000"/>
+                  </a:schemeClr>
+                </a:solidFill>
+              </a:rPr>
+              <a:t>eth2</a:t>
+            </a:r>
+          </a:p>
+        </p:txBody>
+      </p:sp>
+      <p:sp>
+        <p:nvSpPr>
+          <p:cNvPr id="26" name="CasellaDiTesto 25"/>
+          <p:cNvSpPr txBox="1"/>
+          <p:nvPr/>
+        </p:nvSpPr>
+        <p:spPr>
+          <a:xfrm>
+            <a:off x="1924347" y="4869136"/>
+            <a:ext cx="470770" cy="276999"/>
+          </a:xfrm>
+          <a:prstGeom prst="rect">
+            <a:avLst/>
+          </a:prstGeom>
+          <a:noFill/>
+        </p:spPr>
+        <p:txBody>
+          <a:bodyPr wrap="none" rtlCol="0">
+            <a:spAutoFit/>
+          </a:bodyPr>
+          <a:lstStyle/>
+          <a:p>
+            <a:pPr algn="ctr"/>
+            <a:r>
+              <a:rPr lang="it-IT" sz="1200" dirty="0">
+                <a:solidFill>
+                  <a:schemeClr val="bg1">
+                    <a:lumMod val="65000"/>
+                  </a:schemeClr>
+                </a:solidFill>
+              </a:rPr>
+              <a:t>eth1</a:t>
+            </a:r>
+          </a:p>
+        </p:txBody>
+      </p:sp>
+    </p:spTree>
+    <p:extLst>
+      <p:ext uri="{BB962C8B-B14F-4D97-AF65-F5344CB8AC3E}">
+        <p14:creationId xmlns:p14="http://schemas.microsoft.com/office/powerpoint/2010/main" val="3330417980"/>
       </p:ext>
     </p:extLst>
   </p:cSld>

</xml_diff>